<commit_message>
center shapes on slides
</commit_message>
<xml_diff>
--- a/testprs.pptx
+++ b/testprs.pptx
@@ -3377,7 +3377,7 @@
         </p:blipFill>
         <p:spPr>
           <a:xfrm>
-            <a:off x="6009443" y="729000"/>
+            <a:off x="3396000" y="729000"/>
             <a:ext cx="5400000" cy="5400000"/>
           </a:xfrm>
           <a:prstGeom prst="rect">
@@ -3443,7 +3443,7 @@
         </p:blipFill>
         <p:spPr>
           <a:xfrm>
-            <a:off x="5384760" y="1381021"/>
+            <a:off x="3396000" y="729000"/>
             <a:ext cx="5400000" cy="5400000"/>
           </a:xfrm>
           <a:prstGeom prst="rect">
@@ -3509,7 +3509,7 @@
         </p:blipFill>
         <p:spPr>
           <a:xfrm>
-            <a:off x="1736038" y="848361"/>
+            <a:off x="3396000" y="729000"/>
             <a:ext cx="5400000" cy="5400000"/>
           </a:xfrm>
           <a:prstGeom prst="rect">

</xml_diff>

<commit_message>
add 4:3 layout and resize images to it
</commit_message>
<xml_diff>
--- a/testprs.pptx
+++ b/testprs.pptx
@@ -9,7 +9,7 @@
     <p:sldId id="258" r:id="rId3"/>
     <p:sldId id="257" r:id="rId4"/>
   </p:sldIdLst>
-  <p:sldSz cx="12192000" cy="6858000"/>
+  <p:sldSz cx="9144000" cy="6858000"/>
   <p:notesSz cx="6858000" cy="9144000"/>
   <p:defaultTextStyle>
     <a:defPPr>
@@ -3377,8 +3377,8 @@
         </p:blipFill>
         <p:spPr>
           <a:xfrm>
-            <a:off x="3396000" y="729000"/>
-            <a:ext cx="5400000" cy="5400000"/>
+            <a:off x="0" y="0"/>
+            <a:ext cx="9144000" cy="6858000"/>
           </a:xfrm>
           <a:prstGeom prst="rect">
             <a:avLst/>
@@ -3443,8 +3443,8 @@
         </p:blipFill>
         <p:spPr>
           <a:xfrm>
-            <a:off x="3396000" y="729000"/>
-            <a:ext cx="5400000" cy="5400000"/>
+            <a:off x="0" y="0"/>
+            <a:ext cx="9144000" cy="6858000"/>
           </a:xfrm>
           <a:prstGeom prst="rect">
             <a:avLst/>
@@ -3509,8 +3509,8 @@
         </p:blipFill>
         <p:spPr>
           <a:xfrm>
-            <a:off x="3396000" y="729000"/>
-            <a:ext cx="5400000" cy="5400000"/>
+            <a:off x="0" y="0"/>
+            <a:ext cx="9144000" cy="6858000"/>
           </a:xfrm>
           <a:prstGeom prst="rect">
             <a:avLst/>

</xml_diff>